<commit_message>
edit milestones and ppt
</commit_message>
<xml_diff>
--- a/engineeringcourse/2017_Eng_2Semester/2017_arcade/arcade.pptx
+++ b/engineeringcourse/2017_Eng_2Semester/2017_arcade/arcade.pptx
@@ -260,7 +260,7 @@
           <a:p>
             <a:fld id="{392167F6-B907-4BD5-9C01-FFCDB72F2DD9}" type="datetimeFigureOut">
               <a:rPr lang="en-US" smtClean="0"/>
-              <a:t>12-Jan-18</a:t>
+              <a:t>06-Feb-18</a:t>
             </a:fld>
             <a:endParaRPr lang="en-US"/>
           </a:p>
@@ -471,7 +471,7 @@
           <a:p>
             <a:fld id="{392167F6-B907-4BD5-9C01-FFCDB72F2DD9}" type="datetimeFigureOut">
               <a:rPr lang="en-US" smtClean="0"/>
-              <a:t>12-Jan-18</a:t>
+              <a:t>06-Feb-18</a:t>
             </a:fld>
             <a:endParaRPr lang="en-US"/>
           </a:p>
@@ -686,7 +686,7 @@
           <a:p>
             <a:fld id="{392167F6-B907-4BD5-9C01-FFCDB72F2DD9}" type="datetimeFigureOut">
               <a:rPr lang="en-US" smtClean="0"/>
-              <a:t>12-Jan-18</a:t>
+              <a:t>06-Feb-18</a:t>
             </a:fld>
             <a:endParaRPr lang="en-US"/>
           </a:p>
@@ -887,7 +887,7 @@
           <a:p>
             <a:fld id="{392167F6-B907-4BD5-9C01-FFCDB72F2DD9}" type="datetimeFigureOut">
               <a:rPr lang="en-US" smtClean="0"/>
-              <a:t>12-Jan-18</a:t>
+              <a:t>06-Feb-18</a:t>
             </a:fld>
             <a:endParaRPr lang="en-US"/>
           </a:p>
@@ -1166,7 +1166,7 @@
           <a:p>
             <a:fld id="{392167F6-B907-4BD5-9C01-FFCDB72F2DD9}" type="datetimeFigureOut">
               <a:rPr lang="en-US" smtClean="0"/>
-              <a:t>12-Jan-18</a:t>
+              <a:t>06-Feb-18</a:t>
             </a:fld>
             <a:endParaRPr lang="en-US"/>
           </a:p>
@@ -1434,7 +1434,7 @@
           <a:p>
             <a:fld id="{392167F6-B907-4BD5-9C01-FFCDB72F2DD9}" type="datetimeFigureOut">
               <a:rPr lang="en-US" smtClean="0"/>
-              <a:t>12-Jan-18</a:t>
+              <a:t>06-Feb-18</a:t>
             </a:fld>
             <a:endParaRPr lang="en-US"/>
           </a:p>
@@ -1850,7 +1850,7 @@
           <a:p>
             <a:fld id="{392167F6-B907-4BD5-9C01-FFCDB72F2DD9}" type="datetimeFigureOut">
               <a:rPr lang="en-US" smtClean="0"/>
-              <a:t>12-Jan-18</a:t>
+              <a:t>06-Feb-18</a:t>
             </a:fld>
             <a:endParaRPr lang="en-US"/>
           </a:p>
@@ -1999,7 +1999,7 @@
           <a:p>
             <a:fld id="{392167F6-B907-4BD5-9C01-FFCDB72F2DD9}" type="datetimeFigureOut">
               <a:rPr lang="en-US" smtClean="0"/>
-              <a:t>12-Jan-18</a:t>
+              <a:t>06-Feb-18</a:t>
             </a:fld>
             <a:endParaRPr lang="en-US"/>
           </a:p>
@@ -2125,7 +2125,7 @@
           <a:p>
             <a:fld id="{392167F6-B907-4BD5-9C01-FFCDB72F2DD9}" type="datetimeFigureOut">
               <a:rPr lang="en-US" smtClean="0"/>
-              <a:t>12-Jan-18</a:t>
+              <a:t>06-Feb-18</a:t>
             </a:fld>
             <a:endParaRPr lang="en-US"/>
           </a:p>
@@ -2376,7 +2376,7 @@
           <a:p>
             <a:fld id="{392167F6-B907-4BD5-9C01-FFCDB72F2DD9}" type="datetimeFigureOut">
               <a:rPr lang="en-US" smtClean="0"/>
-              <a:t>12-Jan-18</a:t>
+              <a:t>06-Feb-18</a:t>
             </a:fld>
             <a:endParaRPr lang="en-US"/>
           </a:p>
@@ -2821,7 +2821,7 @@
           <a:p>
             <a:fld id="{392167F6-B907-4BD5-9C01-FFCDB72F2DD9}" type="datetimeFigureOut">
               <a:rPr lang="en-US" smtClean="0"/>
-              <a:t>12-Jan-18</a:t>
+              <a:t>06-Feb-18</a:t>
             </a:fld>
             <a:endParaRPr lang="en-US"/>
           </a:p>
@@ -3147,7 +3147,7 @@
           <a:p>
             <a:fld id="{392167F6-B907-4BD5-9C01-FFCDB72F2DD9}" type="datetimeFigureOut">
               <a:rPr lang="en-US" smtClean="0"/>
-              <a:t>12-Jan-18</a:t>
+              <a:t>06-Feb-18</a:t>
             </a:fld>
             <a:endParaRPr lang="en-US"/>
           </a:p>
@@ -4187,7 +4187,12 @@
             <p:ph idx="1"/>
           </p:nvPr>
         </p:nvSpPr>
-        <p:spPr/>
+        <p:spPr>
+          <a:xfrm>
+            <a:off x="1451579" y="2015732"/>
+            <a:ext cx="9603275" cy="3450613"/>
+          </a:xfrm>
+        </p:spPr>
         <p:txBody>
           <a:bodyPr>
             <a:normAutofit/>
@@ -4218,13 +4223,7 @@
           <a:p>
             <a:r>
               <a:rPr lang="en-US" dirty="0"/>
-              <a:t> Feb 15: configuring the controllers to communicate between raspberry pi and Arduino</a:t>
-            </a:r>
-          </a:p>
-          <a:p>
-            <a:r>
-              <a:rPr lang="en-US" dirty="0"/>
-              <a:t> Feb 28: continue working with the controllers to ensure that they are working properly. </a:t>
+              <a:t>Feb 28: continue working with the controllers to ensure that they are working properly. </a:t>
             </a:r>
           </a:p>
           <a:p>

</xml_diff>